<commit_message>
Update UT-IfcCourse and IfcPavement to IFC4X3RC3
</commit_message>
<xml_diff>
--- a/UT-IfcCourse/UT-IfcCourse.pptx
+++ b/UT-IfcCourse/UT-IfcCourse.pptx
@@ -7,8 +7,9 @@
   <p:sldIdLst>
     <p:sldId id="265" r:id="rId2"/>
     <p:sldId id="256" r:id="rId3"/>
-    <p:sldId id="258" r:id="rId4"/>
-    <p:sldId id="260" r:id="rId5"/>
+    <p:sldId id="257" r:id="rId4"/>
+    <p:sldId id="258" r:id="rId5"/>
+    <p:sldId id="260" r:id="rId6"/>
   </p:sldIdLst>
   <p:sldSz cx="12192000" cy="6858000"/>
   <p:notesSz cx="6858000" cy="9144000"/>
@@ -262,7 +263,7 @@
           <a:p>
             <a:fld id="{D0006B6C-D873-49FC-9875-D786E6E0A267}" type="datetimeFigureOut">
               <a:rPr lang="de-DE" smtClean="0"/>
-              <a:t>17.02.2021</a:t>
+              <a:t>22.03.2021</a:t>
             </a:fld>
             <a:endParaRPr lang="de-DE"/>
           </a:p>
@@ -460,7 +461,7 @@
           <a:p>
             <a:fld id="{D0006B6C-D873-49FC-9875-D786E6E0A267}" type="datetimeFigureOut">
               <a:rPr lang="de-DE" smtClean="0"/>
-              <a:t>17.02.2021</a:t>
+              <a:t>22.03.2021</a:t>
             </a:fld>
             <a:endParaRPr lang="de-DE"/>
           </a:p>
@@ -668,7 +669,7 @@
           <a:p>
             <a:fld id="{D0006B6C-D873-49FC-9875-D786E6E0A267}" type="datetimeFigureOut">
               <a:rPr lang="de-DE" smtClean="0"/>
-              <a:t>17.02.2021</a:t>
+              <a:t>22.03.2021</a:t>
             </a:fld>
             <a:endParaRPr lang="de-DE"/>
           </a:p>
@@ -866,7 +867,7 @@
           <a:p>
             <a:fld id="{D0006B6C-D873-49FC-9875-D786E6E0A267}" type="datetimeFigureOut">
               <a:rPr lang="de-DE" smtClean="0"/>
-              <a:t>17.02.2021</a:t>
+              <a:t>22.03.2021</a:t>
             </a:fld>
             <a:endParaRPr lang="de-DE"/>
           </a:p>
@@ -1141,7 +1142,7 @@
           <a:p>
             <a:fld id="{D0006B6C-D873-49FC-9875-D786E6E0A267}" type="datetimeFigureOut">
               <a:rPr lang="de-DE" smtClean="0"/>
-              <a:t>17.02.2021</a:t>
+              <a:t>22.03.2021</a:t>
             </a:fld>
             <a:endParaRPr lang="de-DE"/>
           </a:p>
@@ -1406,7 +1407,7 @@
           <a:p>
             <a:fld id="{D0006B6C-D873-49FC-9875-D786E6E0A267}" type="datetimeFigureOut">
               <a:rPr lang="de-DE" smtClean="0"/>
-              <a:t>17.02.2021</a:t>
+              <a:t>22.03.2021</a:t>
             </a:fld>
             <a:endParaRPr lang="de-DE"/>
           </a:p>
@@ -1818,7 +1819,7 @@
           <a:p>
             <a:fld id="{D0006B6C-D873-49FC-9875-D786E6E0A267}" type="datetimeFigureOut">
               <a:rPr lang="de-DE" smtClean="0"/>
-              <a:t>17.02.2021</a:t>
+              <a:t>22.03.2021</a:t>
             </a:fld>
             <a:endParaRPr lang="de-DE"/>
           </a:p>
@@ -1959,7 +1960,7 @@
           <a:p>
             <a:fld id="{D0006B6C-D873-49FC-9875-D786E6E0A267}" type="datetimeFigureOut">
               <a:rPr lang="de-DE" smtClean="0"/>
-              <a:t>17.02.2021</a:t>
+              <a:t>22.03.2021</a:t>
             </a:fld>
             <a:endParaRPr lang="de-DE"/>
           </a:p>
@@ -2072,7 +2073,7 @@
           <a:p>
             <a:fld id="{D0006B6C-D873-49FC-9875-D786E6E0A267}" type="datetimeFigureOut">
               <a:rPr lang="de-DE" smtClean="0"/>
-              <a:t>17.02.2021</a:t>
+              <a:t>22.03.2021</a:t>
             </a:fld>
             <a:endParaRPr lang="de-DE"/>
           </a:p>
@@ -2383,7 +2384,7 @@
           <a:p>
             <a:fld id="{D0006B6C-D873-49FC-9875-D786E6E0A267}" type="datetimeFigureOut">
               <a:rPr lang="de-DE" smtClean="0"/>
-              <a:t>17.02.2021</a:t>
+              <a:t>22.03.2021</a:t>
             </a:fld>
             <a:endParaRPr lang="de-DE"/>
           </a:p>
@@ -2671,7 +2672,7 @@
           <a:p>
             <a:fld id="{D0006B6C-D873-49FC-9875-D786E6E0A267}" type="datetimeFigureOut">
               <a:rPr lang="de-DE" smtClean="0"/>
-              <a:t>17.02.2021</a:t>
+              <a:t>22.03.2021</a:t>
             </a:fld>
             <a:endParaRPr lang="de-DE"/>
           </a:p>
@@ -2912,7 +2913,7 @@
           <a:p>
             <a:fld id="{D0006B6C-D873-49FC-9875-D786E6E0A267}" type="datetimeFigureOut">
               <a:rPr lang="de-DE" smtClean="0"/>
-              <a:t>17.02.2021</a:t>
+              <a:t>22.03.2021</a:t>
             </a:fld>
             <a:endParaRPr lang="de-DE"/>
           </a:p>
@@ -3351,12 +3352,8 @@
           <a:lstStyle/>
           <a:p>
             <a:r>
-              <a:rPr lang="de-DE" dirty="0" err="1"/>
-              <a:t>IfcCourse</a:t>
-            </a:r>
-            <a:r>
               <a:rPr lang="de-DE" dirty="0"/>
-              <a:t> Example</a:t>
+              <a:t>IfcCourse Example</a:t>
             </a:r>
           </a:p>
         </p:txBody>
@@ -3513,13 +3510,7 @@
               <a:rPr lang="de-DE" sz="1800" dirty="0">
                 <a:latin typeface="Consolas" panose="020B0609020204030204" pitchFamily="49" charset="0"/>
               </a:rPr>
-              <a:t>Axis = </a:t>
-            </a:r>
-            <a:r>
-              <a:rPr lang="de-DE" sz="1800" dirty="0" err="1">
-                <a:latin typeface="Consolas" panose="020B0609020204030204" pitchFamily="49" charset="0"/>
-              </a:rPr>
-              <a:t>IfcPolyline</a:t>
+              <a:t>IfcAlignmentHorizontal</a:t>
             </a:r>
             <a:endParaRPr lang="de-DE" dirty="0"/>
           </a:p>
@@ -3578,7 +3569,7 @@
         <p:spPr>
           <a:xfrm>
             <a:off x="2429693" y="5671405"/>
-            <a:ext cx="1558834" cy="707886"/>
+            <a:ext cx="1558834" cy="553998"/>
           </a:xfrm>
           <a:prstGeom prst="rect">
             <a:avLst/>
@@ -3605,12 +3596,6 @@
           <a:p>
             <a:r>
               <a:rPr lang="de-DE" sz="1000" dirty="0"/>
-              <a:t>Z = 91.0000</a:t>
-            </a:r>
-          </a:p>
-          <a:p>
-            <a:r>
-              <a:rPr lang="de-DE" sz="1000" dirty="0"/>
               <a:t>DistanceAlong = 0.0</a:t>
             </a:r>
           </a:p>
@@ -3631,7 +3616,7 @@
         <p:spPr>
           <a:xfrm>
             <a:off x="9403081" y="2485478"/>
-            <a:ext cx="1558834" cy="707886"/>
+            <a:ext cx="1558834" cy="553998"/>
           </a:xfrm>
           <a:prstGeom prst="rect">
             <a:avLst/>
@@ -3658,13 +3643,54 @@
           <a:p>
             <a:r>
               <a:rPr lang="de-DE" sz="1000" dirty="0"/>
-              <a:t>Z = 92.0000</a:t>
-            </a:r>
-          </a:p>
+              <a:t>DistanceAlong = 14.142</a:t>
+            </a:r>
+          </a:p>
+        </p:txBody>
+      </p:sp>
+      <p:sp>
+        <p:nvSpPr>
+          <p:cNvPr id="13" name="Textfeld 12">
+            <a:extLst>
+              <a:ext uri="{FF2B5EF4-FFF2-40B4-BE49-F238E27FC236}">
+                <a16:creationId xmlns:a16="http://schemas.microsoft.com/office/drawing/2014/main" id="{28CC5FE7-0F28-40E5-8D33-7554BB6EAF2A}"/>
+              </a:ext>
+            </a:extLst>
+          </p:cNvPr>
+          <p:cNvSpPr txBox="1"/>
+          <p:nvPr/>
+        </p:nvSpPr>
+        <p:spPr>
+          <a:xfrm>
+            <a:off x="5869577" y="4275909"/>
+            <a:ext cx="1976846" cy="553998"/>
+          </a:xfrm>
+          <a:prstGeom prst="rect">
+            <a:avLst/>
+          </a:prstGeom>
+          <a:noFill/>
+        </p:spPr>
+        <p:txBody>
+          <a:bodyPr wrap="square" rtlCol="0">
+            <a:spAutoFit/>
+          </a:bodyPr>
+          <a:lstStyle/>
           <a:p>
             <a:r>
               <a:rPr lang="de-DE" sz="1000" dirty="0"/>
-              <a:t>DistanceAlong = 14.14214</a:t>
+              <a:t>PredefinedType = LINE</a:t>
+            </a:r>
+          </a:p>
+          <a:p>
+            <a:r>
+              <a:rPr lang="de-DE" sz="1000" dirty="0"/>
+              <a:t>StartDirection = 0.785</a:t>
+            </a:r>
+          </a:p>
+          <a:p>
+            <a:r>
+              <a:rPr lang="de-DE" sz="1000" dirty="0"/>
+              <a:t>SegmentLength = 14.142</a:t>
             </a:r>
           </a:p>
         </p:txBody>
@@ -3683,6 +3709,283 @@
 </file>
 
 <file path=ppt/slides/slide3.xml><?xml version="1.0" encoding="utf-8"?>
+<p:sld xmlns:a="http://schemas.openxmlformats.org/drawingml/2006/main" xmlns:r="http://schemas.openxmlformats.org/officeDocument/2006/relationships" xmlns:p="http://schemas.openxmlformats.org/presentationml/2006/main">
+  <p:cSld>
+    <p:spTree>
+      <p:nvGrpSpPr>
+        <p:cNvPr id="1" name=""/>
+        <p:cNvGrpSpPr/>
+        <p:nvPr/>
+      </p:nvGrpSpPr>
+      <p:grpSpPr>
+        <a:xfrm>
+          <a:off x="0" y="0"/>
+          <a:ext cx="0" cy="0"/>
+          <a:chOff x="0" y="0"/>
+          <a:chExt cx="0" cy="0"/>
+        </a:xfrm>
+      </p:grpSpPr>
+      <p:sp>
+        <p:nvSpPr>
+          <p:cNvPr id="2" name="Titel 1">
+            <a:extLst>
+              <a:ext uri="{FF2B5EF4-FFF2-40B4-BE49-F238E27FC236}">
+                <a16:creationId xmlns:a16="http://schemas.microsoft.com/office/drawing/2014/main" id="{A535488A-FA00-4D42-9DAE-EBF529DE1B11}"/>
+              </a:ext>
+            </a:extLst>
+          </p:cNvPr>
+          <p:cNvSpPr>
+            <a:spLocks noGrp="1"/>
+          </p:cNvSpPr>
+          <p:nvPr>
+            <p:ph type="title"/>
+          </p:nvPr>
+        </p:nvSpPr>
+        <p:spPr/>
+        <p:txBody>
+          <a:bodyPr/>
+          <a:lstStyle/>
+          <a:p>
+            <a:r>
+              <a:rPr lang="de-DE" dirty="0"/>
+              <a:t>IfcAlignment</a:t>
+            </a:r>
+          </a:p>
+        </p:txBody>
+      </p:sp>
+      <p:sp>
+        <p:nvSpPr>
+          <p:cNvPr id="3" name="Inhaltsplatzhalter 2">
+            <a:extLst>
+              <a:ext uri="{FF2B5EF4-FFF2-40B4-BE49-F238E27FC236}">
+                <a16:creationId xmlns:a16="http://schemas.microsoft.com/office/drawing/2014/main" id="{D7D0924F-43C2-45FA-9DBD-9312C4DFB56E}"/>
+              </a:ext>
+            </a:extLst>
+          </p:cNvPr>
+          <p:cNvSpPr>
+            <a:spLocks noGrp="1"/>
+          </p:cNvSpPr>
+          <p:nvPr>
+            <p:ph idx="1"/>
+          </p:nvPr>
+        </p:nvSpPr>
+        <p:spPr/>
+        <p:txBody>
+          <a:bodyPr/>
+          <a:lstStyle/>
+          <a:p>
+            <a:r>
+              <a:rPr lang="de-DE" sz="1800" dirty="0">
+                <a:latin typeface="Consolas" panose="020B0609020204030204" pitchFamily="49" charset="0"/>
+              </a:rPr>
+              <a:t>IfcAlignmentVertical</a:t>
+            </a:r>
+            <a:endParaRPr lang="de-DE" sz="1800" dirty="0"/>
+          </a:p>
+          <a:p>
+            <a:endParaRPr lang="de-DE" dirty="0"/>
+          </a:p>
+        </p:txBody>
+      </p:sp>
+      <p:cxnSp>
+        <p:nvCxnSpPr>
+          <p:cNvPr id="5" name="Gerader Verbinder 4">
+            <a:extLst>
+              <a:ext uri="{FF2B5EF4-FFF2-40B4-BE49-F238E27FC236}">
+                <a16:creationId xmlns:a16="http://schemas.microsoft.com/office/drawing/2014/main" id="{D1417254-CAEA-4EDE-AE22-005C0203AF51}"/>
+              </a:ext>
+            </a:extLst>
+          </p:cNvPr>
+          <p:cNvCxnSpPr>
+            <a:cxnSpLocks/>
+          </p:cNvCxnSpPr>
+          <p:nvPr/>
+        </p:nvCxnSpPr>
+        <p:spPr>
+          <a:xfrm flipV="1">
+            <a:off x="1611086" y="2952206"/>
+            <a:ext cx="8482148" cy="2246811"/>
+          </a:xfrm>
+          <a:prstGeom prst="line">
+            <a:avLst/>
+          </a:prstGeom>
+        </p:spPr>
+        <p:style>
+          <a:lnRef idx="1">
+            <a:schemeClr val="accent1"/>
+          </a:lnRef>
+          <a:fillRef idx="0">
+            <a:schemeClr val="accent1"/>
+          </a:fillRef>
+          <a:effectRef idx="0">
+            <a:schemeClr val="accent1"/>
+          </a:effectRef>
+          <a:fontRef idx="minor">
+            <a:schemeClr val="tx1"/>
+          </a:fontRef>
+        </p:style>
+      </p:cxnSp>
+      <p:sp>
+        <p:nvSpPr>
+          <p:cNvPr id="9" name="Textfeld 8">
+            <a:extLst>
+              <a:ext uri="{FF2B5EF4-FFF2-40B4-BE49-F238E27FC236}">
+                <a16:creationId xmlns:a16="http://schemas.microsoft.com/office/drawing/2014/main" id="{2B8B8FB8-01B0-41DA-B358-D35E9174AC20}"/>
+              </a:ext>
+            </a:extLst>
+          </p:cNvPr>
+          <p:cNvSpPr txBox="1"/>
+          <p:nvPr/>
+        </p:nvSpPr>
+        <p:spPr>
+          <a:xfrm>
+            <a:off x="5869577" y="4275909"/>
+            <a:ext cx="1976846" cy="1015663"/>
+          </a:xfrm>
+          <a:prstGeom prst="rect">
+            <a:avLst/>
+          </a:prstGeom>
+          <a:noFill/>
+        </p:spPr>
+        <p:txBody>
+          <a:bodyPr wrap="square" rtlCol="0">
+            <a:spAutoFit/>
+          </a:bodyPr>
+          <a:lstStyle/>
+          <a:p>
+            <a:r>
+              <a:rPr lang="de-DE" sz="1000" dirty="0"/>
+              <a:t>StartDistAlong = 0</a:t>
+            </a:r>
+          </a:p>
+          <a:p>
+            <a:r>
+              <a:rPr lang="de-DE" sz="1000" dirty="0"/>
+              <a:t>StartGradient  = 0.0707</a:t>
+            </a:r>
+          </a:p>
+          <a:p>
+            <a:r>
+              <a:rPr lang="de-DE" sz="1000" dirty="0"/>
+              <a:t>EndGradient = 0.0707</a:t>
+            </a:r>
+          </a:p>
+          <a:p>
+            <a:r>
+              <a:rPr lang="de-DE" sz="1000" dirty="0"/>
+              <a:t>PredefinedType = LINE</a:t>
+            </a:r>
+          </a:p>
+          <a:p>
+            <a:r>
+              <a:rPr lang="de-DE" sz="1000" dirty="0"/>
+              <a:t>StartHeight = 91.0 </a:t>
+            </a:r>
+          </a:p>
+          <a:p>
+            <a:r>
+              <a:rPr lang="de-DE" sz="1000" dirty="0"/>
+              <a:t>HorzontalLength = 14.142</a:t>
+            </a:r>
+          </a:p>
+        </p:txBody>
+      </p:sp>
+      <p:sp>
+        <p:nvSpPr>
+          <p:cNvPr id="10" name="Textfeld 9">
+            <a:extLst>
+              <a:ext uri="{FF2B5EF4-FFF2-40B4-BE49-F238E27FC236}">
+                <a16:creationId xmlns:a16="http://schemas.microsoft.com/office/drawing/2014/main" id="{91F9A58C-3CF6-4D59-8F97-6CA7A43FA097}"/>
+              </a:ext>
+            </a:extLst>
+          </p:cNvPr>
+          <p:cNvSpPr txBox="1"/>
+          <p:nvPr/>
+        </p:nvSpPr>
+        <p:spPr>
+          <a:xfrm>
+            <a:off x="1436915" y="5333954"/>
+            <a:ext cx="757646" cy="400110"/>
+          </a:xfrm>
+          <a:prstGeom prst="rect">
+            <a:avLst/>
+          </a:prstGeom>
+          <a:noFill/>
+        </p:spPr>
+        <p:txBody>
+          <a:bodyPr wrap="square" rtlCol="0">
+            <a:spAutoFit/>
+          </a:bodyPr>
+          <a:lstStyle/>
+          <a:p>
+            <a:r>
+              <a:rPr lang="de-DE" sz="1000" dirty="0"/>
+              <a:t>X = 0.0</a:t>
+            </a:r>
+          </a:p>
+          <a:p>
+            <a:r>
+              <a:rPr lang="de-DE" sz="1000" dirty="0"/>
+              <a:t>Y = 91.0</a:t>
+            </a:r>
+          </a:p>
+        </p:txBody>
+      </p:sp>
+      <p:sp>
+        <p:nvSpPr>
+          <p:cNvPr id="11" name="Textfeld 10">
+            <a:extLst>
+              <a:ext uri="{FF2B5EF4-FFF2-40B4-BE49-F238E27FC236}">
+                <a16:creationId xmlns:a16="http://schemas.microsoft.com/office/drawing/2014/main" id="{F83DF855-F008-47FF-A297-5B8C4DB226EC}"/>
+              </a:ext>
+            </a:extLst>
+          </p:cNvPr>
+          <p:cNvSpPr txBox="1"/>
+          <p:nvPr/>
+        </p:nvSpPr>
+        <p:spPr>
+          <a:xfrm>
+            <a:off x="9923925" y="3100206"/>
+            <a:ext cx="1006929" cy="400110"/>
+          </a:xfrm>
+          <a:prstGeom prst="rect">
+            <a:avLst/>
+          </a:prstGeom>
+          <a:noFill/>
+        </p:spPr>
+        <p:txBody>
+          <a:bodyPr wrap="square" rtlCol="0">
+            <a:spAutoFit/>
+          </a:bodyPr>
+          <a:lstStyle/>
+          <a:p>
+            <a:r>
+              <a:rPr lang="de-DE" sz="1000" dirty="0"/>
+              <a:t>X = 14.142</a:t>
+            </a:r>
+          </a:p>
+          <a:p>
+            <a:r>
+              <a:rPr lang="de-DE" sz="1000" dirty="0"/>
+              <a:t>Y = 92.0</a:t>
+            </a:r>
+          </a:p>
+        </p:txBody>
+      </p:sp>
+    </p:spTree>
+    <p:extLst>
+      <p:ext uri="{BB962C8B-B14F-4D97-AF65-F5344CB8AC3E}">
+        <p14:creationId xmlns:p14="http://schemas.microsoft.com/office/powerpoint/2010/main" val="2604525177"/>
+      </p:ext>
+    </p:extLst>
+  </p:cSld>
+  <p:clrMapOvr>
+    <a:masterClrMapping/>
+  </p:clrMapOvr>
+</p:sld>
+</file>
+
+<file path=ppt/slides/slide4.xml><?xml version="1.0" encoding="utf-8"?>
 <p:sld xmlns:a="http://schemas.openxmlformats.org/drawingml/2006/main" xmlns:r="http://schemas.openxmlformats.org/officeDocument/2006/relationships" xmlns:p="http://schemas.openxmlformats.org/presentationml/2006/main">
   <p:cSld>
     <p:spTree>
@@ -4528,7 +4831,7 @@
 </p:sld>
 </file>
 
-<file path=ppt/slides/slide4.xml><?xml version="1.0" encoding="utf-8"?>
+<file path=ppt/slides/slide5.xml><?xml version="1.0" encoding="utf-8"?>
 <p:sld xmlns:a="http://schemas.openxmlformats.org/drawingml/2006/main" xmlns:r="http://schemas.openxmlformats.org/officeDocument/2006/relationships" xmlns:p="http://schemas.openxmlformats.org/presentationml/2006/main">
   <p:cSld>
     <p:spTree>

</xml_diff>